<commit_message>
Commit the goal light change
</commit_message>
<xml_diff>
--- a/Flow diagram.pptx
+++ b/Flow diagram.pptx
@@ -5715,6 +5715,7 @@
             </a:avLst>
           </a:prstGeom>
           <a:ln>
+            <a:prstDash val="dash"/>
             <a:tailEnd type="triangle"/>
           </a:ln>
         </p:spPr>
@@ -5782,8 +5783,8 @@
         </p:nvSpPr>
         <p:spPr>
           <a:xfrm>
-            <a:off x="4597575" y="145259"/>
-            <a:ext cx="2571154" cy="784830"/>
+            <a:off x="4597574" y="145259"/>
+            <a:ext cx="3670859" cy="954107"/>
           </a:xfrm>
           <a:prstGeom prst="rect">
             <a:avLst/>
@@ -5795,6 +5796,16 @@
             <a:spAutoFit/>
           </a:bodyPr>
           <a:lstStyle/>
+          <a:p>
+            <a:r>
+              <a:rPr lang="en-US" sz="1100" dirty="0">
+                <a:latin typeface="Menlo" panose="020B0609030804020204" pitchFamily="49" charset="0"/>
+                <a:ea typeface="Menlo" panose="020B0609030804020204" pitchFamily="49" charset="0"/>
+                <a:cs typeface="Menlo" panose="020B0609030804020204" pitchFamily="49" charset="0"/>
+              </a:rPr>
+              <a:t># Flask webhook listener</a:t>
+            </a:r>
+          </a:p>
           <a:p>
             <a:r>
               <a:rPr lang="en-US" sz="1100" dirty="0">
@@ -5810,7 +5821,23 @@
                 <a:ea typeface="Menlo" panose="020B0609030804020204" pitchFamily="49" charset="0"/>
                 <a:cs typeface="Menlo" panose="020B0609030804020204" pitchFamily="49" charset="0"/>
               </a:rPr>
-              <a:t>goal_tracker.py</a:t>
+              <a:t>systemd</a:t>
+            </a:r>
+            <a:r>
+              <a:rPr lang="en-US" sz="1100" dirty="0">
+                <a:latin typeface="Menlo" panose="020B0609030804020204" pitchFamily="49" charset="0"/>
+                <a:ea typeface="Menlo" panose="020B0609030804020204" pitchFamily="49" charset="0"/>
+                <a:cs typeface="Menlo" panose="020B0609030804020204" pitchFamily="49" charset="0"/>
+              </a:rPr>
+              <a:t> for starting </a:t>
+            </a:r>
+            <a:r>
+              <a:rPr lang="en-US" sz="1100" dirty="0" err="1">
+                <a:latin typeface="Menlo" panose="020B0609030804020204" pitchFamily="49" charset="0"/>
+                <a:ea typeface="Menlo" panose="020B0609030804020204" pitchFamily="49" charset="0"/>
+                <a:cs typeface="Menlo" panose="020B0609030804020204" pitchFamily="49" charset="0"/>
+              </a:rPr>
+              <a:t>goal_tracker</a:t>
             </a:r>
             <a:endParaRPr lang="en-US" sz="1100" dirty="0">
               <a:latin typeface="Menlo" panose="020B0609030804020204" pitchFamily="49" charset="0"/>
@@ -5825,7 +5852,7 @@
                 <a:ea typeface="Menlo" panose="020B0609030804020204" pitchFamily="49" charset="0"/>
                 <a:cs typeface="Menlo" panose="020B0609030804020204" pitchFamily="49" charset="0"/>
               </a:rPr>
-              <a:t># watchdog?  </a:t>
+              <a:t># </a:t>
             </a:r>
             <a:r>
               <a:rPr lang="en-US" sz="1100" dirty="0" err="1">
@@ -5833,7 +5860,7 @@
                 <a:ea typeface="Menlo" panose="020B0609030804020204" pitchFamily="49" charset="0"/>
                 <a:cs typeface="Menlo" panose="020B0609030804020204" pitchFamily="49" charset="0"/>
               </a:rPr>
-              <a:t>Nodemon</a:t>
+              <a:t>systemd</a:t>
             </a:r>
             <a:r>
               <a:rPr lang="en-US" sz="1100" dirty="0">
@@ -5841,17 +5868,7 @@
                 <a:ea typeface="Menlo" panose="020B0609030804020204" pitchFamily="49" charset="0"/>
                 <a:cs typeface="Menlo" panose="020B0609030804020204" pitchFamily="49" charset="0"/>
               </a:rPr>
-              <a:t>?</a:t>
-            </a:r>
-          </a:p>
-          <a:p>
-            <a:r>
-              <a:rPr lang="en-US" sz="1100" dirty="0">
-                <a:latin typeface="Menlo" panose="020B0609030804020204" pitchFamily="49" charset="0"/>
-                <a:ea typeface="Menlo" panose="020B0609030804020204" pitchFamily="49" charset="0"/>
-                <a:cs typeface="Menlo" panose="020B0609030804020204" pitchFamily="49" charset="0"/>
-              </a:rPr>
-              <a:t># webhook-listener</a:t>
+              <a:t> for auto restart of flask webhook listener</a:t>
             </a:r>
           </a:p>
           <a:p>

</xml_diff>

<commit_message>
Fix team back to Toronto
</commit_message>
<xml_diff>
--- a/Flow diagram.pptx
+++ b/Flow diagram.pptx
@@ -5,8 +5,7 @@
     <p:sldMasterId id="2147483648" r:id="rId1"/>
   </p:sldMasterIdLst>
   <p:sldIdLst>
-    <p:sldId id="257" r:id="rId2"/>
-    <p:sldId id="258" r:id="rId3"/>
+    <p:sldId id="258" r:id="rId2"/>
   </p:sldIdLst>
   <p:sldSz cx="12192000" cy="6858000"/>
   <p:notesSz cx="6858000" cy="9144000"/>
@@ -3351,7 +3350,7 @@
         </p:blipFill>
         <p:spPr bwMode="auto">
           <a:xfrm>
-            <a:off x="2461213" y="2573907"/>
+            <a:off x="2965042" y="2984483"/>
             <a:ext cx="967678" cy="483839"/>
           </a:xfrm>
           <a:prstGeom prst="rect">
@@ -3431,7 +3430,7 @@
         <p:spPr>
           <a:xfrm>
             <a:off x="4396448" y="1054477"/>
-            <a:ext cx="3959950" cy="2270137"/>
+            <a:ext cx="4894426" cy="2270137"/>
           </a:xfrm>
           <a:prstGeom prst="rect">
             <a:avLst/>
@@ -3492,7 +3491,7 @@
         </p:blipFill>
         <p:spPr bwMode="auto">
           <a:xfrm>
-            <a:off x="6531657" y="1166428"/>
+            <a:off x="7351654" y="1743616"/>
             <a:ext cx="658282" cy="658282"/>
           </a:xfrm>
           <a:prstGeom prst="rect">
@@ -3586,7 +3585,7 @@
         </p:blipFill>
         <p:spPr bwMode="auto">
           <a:xfrm>
-            <a:off x="4454480" y="2150833"/>
+            <a:off x="4463904" y="1959378"/>
             <a:ext cx="1053789" cy="702526"/>
           </a:xfrm>
           <a:prstGeom prst="rect">
@@ -3633,7 +3632,7 @@
         </p:blipFill>
         <p:spPr bwMode="auto">
           <a:xfrm>
-            <a:off x="6428321" y="4642143"/>
+            <a:off x="6410784" y="5247624"/>
             <a:ext cx="1053789" cy="702526"/>
           </a:xfrm>
           <a:prstGeom prst="rect">
@@ -3680,7 +3679,7 @@
         </p:blipFill>
         <p:spPr bwMode="auto">
           <a:xfrm>
-            <a:off x="9125903" y="3034307"/>
+            <a:off x="9290874" y="3429000"/>
             <a:ext cx="992459" cy="992459"/>
           </a:xfrm>
           <a:prstGeom prst="rect">
@@ -3712,8 +3711,8 @@
         </p:nvSpPr>
         <p:spPr>
           <a:xfrm>
-            <a:off x="4435789" y="4131247"/>
-            <a:ext cx="3245006" cy="2270137"/>
+            <a:off x="4435789" y="4935886"/>
+            <a:ext cx="3245006" cy="1465498"/>
           </a:xfrm>
           <a:prstGeom prst="rect">
             <a:avLst/>
@@ -3767,7 +3766,7 @@
         </p:blipFill>
         <p:spPr>
           <a:xfrm>
-            <a:off x="4914122" y="4634950"/>
+            <a:off x="4896585" y="5240431"/>
             <a:ext cx="628034" cy="645008"/>
           </a:xfrm>
           <a:prstGeom prst="rect">
@@ -3789,8 +3788,8 @@
         </p:nvSpPr>
         <p:spPr>
           <a:xfrm>
-            <a:off x="2543162" y="5028227"/>
-            <a:ext cx="1532920" cy="276999"/>
+            <a:off x="609395" y="4176225"/>
+            <a:ext cx="2390477" cy="646331"/>
           </a:xfrm>
           <a:prstGeom prst="rect">
             <a:avLst/>
@@ -3798,14 +3797,18 @@
           <a:noFill/>
         </p:spPr>
         <p:txBody>
-          <a:bodyPr wrap="none" rtlCol="0">
+          <a:bodyPr wrap="square" rtlCol="0">
             <a:spAutoFit/>
           </a:bodyPr>
           <a:lstStyle/>
           <a:p>
             <a:r>
+              <a:rPr lang="en-US" sz="1200" dirty="0" err="1"/>
+              <a:t>Github</a:t>
+            </a:r>
+            <a:r>
               <a:rPr lang="en-US" sz="1200" dirty="0"/>
-              <a:t>Listen for git commits</a:t>
+              <a:t> Actions POSTs to external HA webhook when there are commits</a:t>
             </a:r>
           </a:p>
         </p:txBody>
@@ -3828,8 +3831,8 @@
         </p:nvCxnSpPr>
         <p:spPr>
           <a:xfrm rot="16200000" flipH="1">
-            <a:off x="2979733" y="3023065"/>
-            <a:ext cx="1899708" cy="1969070"/>
+            <a:off x="3125427" y="3791776"/>
+            <a:ext cx="2094613" cy="1447704"/>
           </a:xfrm>
           <a:prstGeom prst="bentConnector2">
             <a:avLst/>
@@ -3867,8 +3870,8 @@
         </p:nvSpPr>
         <p:spPr>
           <a:xfrm>
-            <a:off x="5363516" y="3545194"/>
-            <a:ext cx="1097765" cy="461665"/>
+            <a:off x="5210602" y="3727876"/>
+            <a:ext cx="1591701" cy="646331"/>
           </a:xfrm>
           <a:prstGeom prst="rect">
             <a:avLst/>
@@ -3883,7 +3886,15 @@
           <a:p>
             <a:r>
               <a:rPr lang="en-US" sz="1200" dirty="0"/>
-              <a:t>Call webhook to pull latest</a:t>
+              <a:t>POST to </a:t>
+            </a:r>
+            <a:r>
+              <a:rPr lang="en-US" sz="1200" dirty="0" err="1"/>
+              <a:t>RaspPI</a:t>
+            </a:r>
+            <a:r>
+              <a:rPr lang="en-US" sz="1200" dirty="0"/>
+              <a:t> webhook when there are commits</a:t>
             </a:r>
           </a:p>
         </p:txBody>
@@ -3906,8 +3917,8 @@
         </p:nvCxnSpPr>
         <p:spPr>
           <a:xfrm rot="16200000" flipV="1">
-            <a:off x="4213962" y="3620773"/>
-            <a:ext cx="1781591" cy="246764"/>
+            <a:off x="3811438" y="3841266"/>
+            <a:ext cx="2578527" cy="219803"/>
           </a:xfrm>
           <a:prstGeom prst="bentConnector3">
             <a:avLst>
@@ -3950,12 +3961,15 @@
           <p:nvPr/>
         </p:nvCxnSpPr>
         <p:spPr>
-          <a:xfrm rot="5400000" flipH="1" flipV="1">
-            <a:off x="5428884" y="1048060"/>
-            <a:ext cx="655264" cy="1550282"/>
-          </a:xfrm>
-          <a:prstGeom prst="bentConnector2">
-            <a:avLst/>
+          <a:xfrm rot="16200000" flipH="1">
+            <a:off x="6114536" y="835640"/>
+            <a:ext cx="113379" cy="2360855"/>
+          </a:xfrm>
+          <a:prstGeom prst="bentConnector4">
+            <a:avLst>
+              <a:gd name="adj1" fmla="val -201625"/>
+              <a:gd name="adj2" fmla="val 61159"/>
+            </a:avLst>
           </a:prstGeom>
           <a:ln>
             <a:tailEnd type="triangle"/>
@@ -3990,8 +4004,8 @@
         </p:nvSpPr>
         <p:spPr>
           <a:xfrm>
-            <a:off x="5273709" y="1554387"/>
-            <a:ext cx="1097765" cy="830997"/>
+            <a:off x="5455874" y="2108155"/>
+            <a:ext cx="1683339" cy="646331"/>
           </a:xfrm>
           <a:prstGeom prst="rect">
             <a:avLst/>
@@ -4006,7 +4020,15 @@
           <a:p>
             <a:r>
               <a:rPr lang="en-US" sz="1200" dirty="0"/>
-              <a:t>Update script; kill existing process, restart</a:t>
+              <a:t>Pull script changes from </a:t>
+            </a:r>
+            <a:r>
+              <a:rPr lang="en-US" sz="1200" dirty="0" err="1"/>
+              <a:t>github</a:t>
+            </a:r>
+            <a:r>
+              <a:rPr lang="en-US" sz="1200" dirty="0"/>
+              <a:t>; kill existing process, restart</a:t>
             </a:r>
           </a:p>
         </p:txBody>
@@ -4028,9 +4050,9 @@
           <p:nvPr/>
         </p:nvCxnSpPr>
         <p:spPr>
-          <a:xfrm rot="16200000" flipH="1">
-            <a:off x="5499291" y="3186217"/>
-            <a:ext cx="2817433" cy="94418"/>
+          <a:xfrm rot="5400000">
+            <a:off x="5886374" y="3453203"/>
+            <a:ext cx="2845726" cy="743116"/>
           </a:xfrm>
           <a:prstGeom prst="bentConnector3">
             <a:avLst>
@@ -4070,7 +4092,7 @@
         </p:nvSpPr>
         <p:spPr>
           <a:xfrm>
-            <a:off x="7190547" y="1176870"/>
+            <a:off x="7269528" y="1113700"/>
             <a:ext cx="1097765" cy="646331"/>
           </a:xfrm>
           <a:prstGeom prst="rect">
@@ -4105,7 +4127,7 @@
         </p:nvSpPr>
         <p:spPr>
           <a:xfrm>
-            <a:off x="6903529" y="2158409"/>
+            <a:off x="7810241" y="2337662"/>
             <a:ext cx="1265734" cy="830997"/>
           </a:xfrm>
           <a:prstGeom prst="rect">
@@ -4144,8 +4166,8 @@
         </p:nvCxnSpPr>
         <p:spPr>
           <a:xfrm flipV="1">
-            <a:off x="7482110" y="3530537"/>
-            <a:ext cx="1643793" cy="1462869"/>
+            <a:off x="7464573" y="3925230"/>
+            <a:ext cx="1826301" cy="1673657"/>
           </a:xfrm>
           <a:prstGeom prst="bentConnector3">
             <a:avLst>
@@ -4185,8 +4207,8 @@
         </p:nvSpPr>
         <p:spPr>
           <a:xfrm>
-            <a:off x="8356398" y="4612728"/>
-            <a:ext cx="1265734" cy="276999"/>
+            <a:off x="8356397" y="4612728"/>
+            <a:ext cx="1461369" cy="276999"/>
           </a:xfrm>
           <a:prstGeom prst="rect">
             <a:avLst/>
@@ -4201,7 +4223,7 @@
           <a:p>
             <a:r>
               <a:rPr lang="en-US" sz="1200" dirty="0"/>
-              <a:t>Call smart switch</a:t>
+              <a:t>Toggle smart switch</a:t>
             </a:r>
           </a:p>
         </p:txBody>
@@ -4224,8 +4246,8 @@
         </p:nvCxnSpPr>
         <p:spPr>
           <a:xfrm flipV="1">
-            <a:off x="10118362" y="2620880"/>
-            <a:ext cx="621779" cy="909657"/>
+            <a:off x="10283333" y="2620880"/>
+            <a:ext cx="456808" cy="1304350"/>
           </a:xfrm>
           <a:prstGeom prst="bentConnector3">
             <a:avLst>
@@ -4288,10 +4310,10 @@
       </p:sp>
       <p:pic>
         <p:nvPicPr>
-          <p:cNvPr id="1030" name="Picture 6" descr="Nas icon">
-            <a:extLst>
-              <a:ext uri="{FF2B5EF4-FFF2-40B4-BE49-F238E27FC236}">
-                <a16:creationId xmlns:a16="http://schemas.microsoft.com/office/drawing/2014/main" id="{1543B020-946E-18CB-48CF-02379AC7E6E6}"/>
+          <p:cNvPr id="1038" name="Picture 14" descr="A refreshed logo for Home Assistant! - Home Assistant">
+            <a:extLst>
+              <a:ext uri="{FF2B5EF4-FFF2-40B4-BE49-F238E27FC236}">
+                <a16:creationId xmlns:a16="http://schemas.microsoft.com/office/drawing/2014/main" id="{8E44643C-8363-F92A-80B6-F33B5F8B31F4}"/>
               </a:ext>
             </a:extLst>
           </p:cNvPr>
@@ -4315,8 +4337,8 @@
         </p:blipFill>
         <p:spPr bwMode="auto">
           <a:xfrm>
-            <a:off x="4076082" y="734112"/>
-            <a:ext cx="640730" cy="640730"/>
+            <a:off x="4113761" y="4532624"/>
+            <a:ext cx="579863" cy="579863"/>
           </a:xfrm>
           <a:prstGeom prst="rect">
             <a:avLst/>
@@ -4333,53 +4355,6 @@
           </a:extLst>
         </p:spPr>
       </p:pic>
-      <p:pic>
-        <p:nvPicPr>
-          <p:cNvPr id="1038" name="Picture 14" descr="A refreshed logo for Home Assistant! - Home Assistant">
-            <a:extLst>
-              <a:ext uri="{FF2B5EF4-FFF2-40B4-BE49-F238E27FC236}">
-                <a16:creationId xmlns:a16="http://schemas.microsoft.com/office/drawing/2014/main" id="{8E44643C-8363-F92A-80B6-F33B5F8B31F4}"/>
-              </a:ext>
-            </a:extLst>
-          </p:cNvPr>
-          <p:cNvPicPr>
-            <a:picLocks noChangeAspect="1" noChangeArrowheads="1"/>
-          </p:cNvPicPr>
-          <p:nvPr/>
-        </p:nvPicPr>
-        <p:blipFill>
-          <a:blip r:embed="rId10">
-            <a:extLst>
-              <a:ext uri="{28A0092B-C50C-407E-A947-70E740481C1C}">
-                <a14:useLocalDpi xmlns:a14="http://schemas.microsoft.com/office/drawing/2010/main" val="0"/>
-              </a:ext>
-            </a:extLst>
-          </a:blip>
-          <a:srcRect/>
-          <a:stretch>
-            <a:fillRect/>
-          </a:stretch>
-        </p:blipFill>
-        <p:spPr bwMode="auto">
-          <a:xfrm>
-            <a:off x="4148492" y="3845380"/>
-            <a:ext cx="579863" cy="579863"/>
-          </a:xfrm>
-          <a:prstGeom prst="rect">
-            <a:avLst/>
-          </a:prstGeom>
-          <a:noFill/>
-          <a:extLst>
-            <a:ext uri="{909E8E84-426E-40DD-AFC4-6F175D3DCCD1}">
-              <a14:hiddenFill xmlns:a14="http://schemas.microsoft.com/office/drawing/2010/main">
-                <a:solidFill>
-                  <a:srgbClr val="FFFFFF"/>
-                </a:solidFill>
-              </a14:hiddenFill>
-            </a:ext>
-          </a:extLst>
-        </p:spPr>
-      </p:pic>
       <p:cxnSp>
         <p:nvCxnSpPr>
           <p:cNvPr id="43" name="Elbow Connector 42">
@@ -4399,7 +4374,7 @@
         <p:spPr>
           <a:xfrm>
             <a:off x="1409717" y="2804132"/>
-            <a:ext cx="1051496" cy="11695"/>
+            <a:ext cx="1555325" cy="422271"/>
           </a:xfrm>
           <a:prstGeom prst="bentConnector3">
             <a:avLst>
@@ -4439,7 +4414,7 @@
         </p:nvSpPr>
         <p:spPr>
           <a:xfrm>
-            <a:off x="1296417" y="2330313"/>
+            <a:off x="1975594" y="2476161"/>
             <a:ext cx="1522468" cy="276999"/>
           </a:xfrm>
           <a:prstGeom prst="rect">
@@ -4465,42 +4440,12 @@
           </a:p>
         </p:txBody>
       </p:sp>
-    </p:spTree>
-    <p:extLst>
-      <p:ext uri="{BB962C8B-B14F-4D97-AF65-F5344CB8AC3E}">
-        <p14:creationId xmlns:p14="http://schemas.microsoft.com/office/powerpoint/2010/main" val="2193837993"/>
-      </p:ext>
-    </p:extLst>
-  </p:cSld>
-  <p:clrMapOvr>
-    <a:masterClrMapping/>
-  </p:clrMapOvr>
-</p:sld>
-</file>
-
-<file path=ppt/slides/slide2.xml><?xml version="1.0" encoding="utf-8"?>
-<p:sld xmlns:a="http://schemas.openxmlformats.org/drawingml/2006/main" xmlns:r="http://schemas.openxmlformats.org/officeDocument/2006/relationships" xmlns:p="http://schemas.openxmlformats.org/presentationml/2006/main">
-  <p:cSld>
-    <p:spTree>
-      <p:nvGrpSpPr>
-        <p:cNvPr id="1" name=""/>
-        <p:cNvGrpSpPr/>
-        <p:nvPr/>
-      </p:nvGrpSpPr>
-      <p:grpSpPr>
-        <a:xfrm>
-          <a:off x="0" y="0"/>
-          <a:ext cx="0" cy="0"/>
-          <a:chOff x="0" y="0"/>
-          <a:chExt cx="0" cy="0"/>
-        </a:xfrm>
-      </p:grpSpPr>
       <p:pic>
         <p:nvPicPr>
-          <p:cNvPr id="1026" name="Picture 2" descr="GitHub Logo, Git Hub Icon With Text On White Background 16833880 Vector Art  at Vecteezy">
-            <a:extLst>
-              <a:ext uri="{FF2B5EF4-FFF2-40B4-BE49-F238E27FC236}">
-                <a16:creationId xmlns:a16="http://schemas.microsoft.com/office/drawing/2014/main" id="{3BBC0A73-677E-768E-0A73-4FD75D4152A0}"/>
+          <p:cNvPr id="2050" name="Picture 2" descr="Download Raspberry Pi Logo in SVG Vector or PNG File Format ...">
+            <a:extLst>
+              <a:ext uri="{FF2B5EF4-FFF2-40B4-BE49-F238E27FC236}">
+                <a16:creationId xmlns:a16="http://schemas.microsoft.com/office/drawing/2014/main" id="{5BB0CDAF-B078-76D8-D5EA-BD3D7A6FD400}"/>
               </a:ext>
             </a:extLst>
           </p:cNvPr>
@@ -4510,7 +4455,7 @@
           <p:nvPr/>
         </p:nvPicPr>
         <p:blipFill>
-          <a:blip r:embed="rId2">
+          <a:blip r:embed="rId10">
             <a:extLst>
               <a:ext uri="{28A0092B-C50C-407E-A947-70E740481C1C}">
                 <a14:useLocalDpi xmlns:a14="http://schemas.microsoft.com/office/drawing/2010/main" val="0"/>
@@ -4524,8 +4469,8 @@
         </p:blipFill>
         <p:spPr bwMode="auto">
           <a:xfrm>
-            <a:off x="2461213" y="2573907"/>
-            <a:ext cx="967678" cy="483839"/>
+            <a:off x="3716671" y="540147"/>
+            <a:ext cx="1350803" cy="900535"/>
           </a:xfrm>
           <a:prstGeom prst="rect">
             <a:avLst/>
@@ -4544,10 +4489,10 @@
       </p:pic>
       <p:pic>
         <p:nvPicPr>
-          <p:cNvPr id="1028" name="Picture 4" descr="Visual Studio Code – Aug 2024 (version ...">
-            <a:extLst>
-              <a:ext uri="{FF2B5EF4-FFF2-40B4-BE49-F238E27FC236}">
-                <a16:creationId xmlns:a16="http://schemas.microsoft.com/office/drawing/2014/main" id="{15818FFC-85C8-1459-B685-47866AB16107}"/>
+          <p:cNvPr id="2052" name="Picture 4" descr="Sonos (@Sonos) / X">
+            <a:extLst>
+              <a:ext uri="{FF2B5EF4-FFF2-40B4-BE49-F238E27FC236}">
+                <a16:creationId xmlns:a16="http://schemas.microsoft.com/office/drawing/2014/main" id="{26C00C47-A89F-E384-B84E-E6CD19FC3446}"/>
               </a:ext>
             </a:extLst>
           </p:cNvPr>
@@ -4557,7 +4502,7 @@
           <p:nvPr/>
         </p:nvPicPr>
         <p:blipFill>
-          <a:blip r:embed="rId3">
+          <a:blip r:embed="rId11">
             <a:extLst>
               <a:ext uri="{28A0092B-C50C-407E-A947-70E740481C1C}">
                 <a14:useLocalDpi xmlns:a14="http://schemas.microsoft.com/office/drawing/2010/main" val="0"/>
@@ -4571,8 +4516,8 @@
         </p:blipFill>
         <p:spPr bwMode="auto">
           <a:xfrm>
-            <a:off x="442039" y="2556049"/>
-            <a:ext cx="967678" cy="496166"/>
+            <a:off x="10839589" y="811324"/>
+            <a:ext cx="663774" cy="663774"/>
           </a:xfrm>
           <a:prstGeom prst="rect">
             <a:avLst/>
@@ -4589,12 +4534,200 @@
           </a:extLst>
         </p:spPr>
       </p:pic>
-      <p:sp>
-        <p:nvSpPr>
-          <p:cNvPr id="7" name="Rectangle 6">
-            <a:extLst>
-              <a:ext uri="{FF2B5EF4-FFF2-40B4-BE49-F238E27FC236}">
-                <a16:creationId xmlns:a16="http://schemas.microsoft.com/office/drawing/2014/main" id="{A09C6993-BD00-C54F-86DC-4F89DF088DA2}"/>
+      <p:cxnSp>
+        <p:nvCxnSpPr>
+          <p:cNvPr id="4" name="Elbow Connector 3">
+            <a:extLst>
+              <a:ext uri="{FF2B5EF4-FFF2-40B4-BE49-F238E27FC236}">
+                <a16:creationId xmlns:a16="http://schemas.microsoft.com/office/drawing/2014/main" id="{9C03084C-01FF-EADE-E0EA-41A4C5CB73BE}"/>
+              </a:ext>
+            </a:extLst>
+          </p:cNvPr>
+          <p:cNvCxnSpPr>
+            <a:cxnSpLocks/>
+            <a:stCxn id="1032" idx="3"/>
+            <a:endCxn id="2052" idx="1"/>
+          </p:cNvCxnSpPr>
+          <p:nvPr/>
+        </p:nvCxnSpPr>
+        <p:spPr>
+          <a:xfrm flipV="1">
+            <a:off x="8009936" y="1143211"/>
+            <a:ext cx="2829653" cy="929546"/>
+          </a:xfrm>
+          <a:prstGeom prst="bentConnector3">
+            <a:avLst>
+              <a:gd name="adj1" fmla="val 50000"/>
+            </a:avLst>
+          </a:prstGeom>
+          <a:ln>
+            <a:prstDash val="solid"/>
+            <a:tailEnd type="triangle"/>
+          </a:ln>
+        </p:spPr>
+        <p:style>
+          <a:lnRef idx="1">
+            <a:schemeClr val="accent1"/>
+          </a:lnRef>
+          <a:fillRef idx="0">
+            <a:schemeClr val="accent1"/>
+          </a:fillRef>
+          <a:effectRef idx="0">
+            <a:schemeClr val="accent1"/>
+          </a:effectRef>
+          <a:fontRef idx="minor">
+            <a:schemeClr val="tx1"/>
+          </a:fontRef>
+        </p:style>
+      </p:cxnSp>
+      <p:sp>
+        <p:nvSpPr>
+          <p:cNvPr id="25" name="TextBox 24">
+            <a:extLst>
+              <a:ext uri="{FF2B5EF4-FFF2-40B4-BE49-F238E27FC236}">
+                <a16:creationId xmlns:a16="http://schemas.microsoft.com/office/drawing/2014/main" id="{32781755-4071-3151-96C2-6097FFA1B5D5}"/>
+              </a:ext>
+            </a:extLst>
+          </p:cNvPr>
+          <p:cNvSpPr txBox="1"/>
+          <p:nvPr/>
+        </p:nvSpPr>
+        <p:spPr>
+          <a:xfrm>
+            <a:off x="9466625" y="811324"/>
+            <a:ext cx="1097765" cy="276999"/>
+          </a:xfrm>
+          <a:prstGeom prst="rect">
+            <a:avLst/>
+          </a:prstGeom>
+          <a:noFill/>
+        </p:spPr>
+        <p:txBody>
+          <a:bodyPr wrap="square" rtlCol="0">
+            <a:spAutoFit/>
+          </a:bodyPr>
+          <a:lstStyle/>
+          <a:p>
+            <a:r>
+              <a:rPr lang="en-US" sz="1200" dirty="0"/>
+              <a:t>Play goal horn</a:t>
+            </a:r>
+          </a:p>
+        </p:txBody>
+      </p:sp>
+      <p:sp>
+        <p:nvSpPr>
+          <p:cNvPr id="33" name="TextBox 32">
+            <a:extLst>
+              <a:ext uri="{FF2B5EF4-FFF2-40B4-BE49-F238E27FC236}">
+                <a16:creationId xmlns:a16="http://schemas.microsoft.com/office/drawing/2014/main" id="{D7C22050-A004-9DDE-51D5-9FAAABEFC219}"/>
+              </a:ext>
+            </a:extLst>
+          </p:cNvPr>
+          <p:cNvSpPr txBox="1"/>
+          <p:nvPr/>
+        </p:nvSpPr>
+        <p:spPr>
+          <a:xfrm>
+            <a:off x="4597574" y="145259"/>
+            <a:ext cx="3670859" cy="954107"/>
+          </a:xfrm>
+          <a:prstGeom prst="rect">
+            <a:avLst/>
+          </a:prstGeom>
+          <a:noFill/>
+        </p:spPr>
+        <p:txBody>
+          <a:bodyPr wrap="square" rtlCol="0">
+            <a:spAutoFit/>
+          </a:bodyPr>
+          <a:lstStyle/>
+          <a:p>
+            <a:r>
+              <a:rPr lang="en-US" sz="1100" dirty="0">
+                <a:latin typeface="Menlo" panose="020B0609030804020204" pitchFamily="49" charset="0"/>
+                <a:ea typeface="Menlo" panose="020B0609030804020204" pitchFamily="49" charset="0"/>
+                <a:cs typeface="Menlo" panose="020B0609030804020204" pitchFamily="49" charset="0"/>
+              </a:rPr>
+              <a:t># Flask webhook listener</a:t>
+            </a:r>
+          </a:p>
+          <a:p>
+            <a:r>
+              <a:rPr lang="en-US" sz="1100" dirty="0">
+                <a:latin typeface="Menlo" panose="020B0609030804020204" pitchFamily="49" charset="0"/>
+                <a:ea typeface="Menlo" panose="020B0609030804020204" pitchFamily="49" charset="0"/>
+                <a:cs typeface="Menlo" panose="020B0609030804020204" pitchFamily="49" charset="0"/>
+              </a:rPr>
+              <a:t># </a:t>
+            </a:r>
+            <a:r>
+              <a:rPr lang="en-US" sz="1100" dirty="0" err="1">
+                <a:latin typeface="Menlo" panose="020B0609030804020204" pitchFamily="49" charset="0"/>
+                <a:ea typeface="Menlo" panose="020B0609030804020204" pitchFamily="49" charset="0"/>
+                <a:cs typeface="Menlo" panose="020B0609030804020204" pitchFamily="49" charset="0"/>
+              </a:rPr>
+              <a:t>systemd</a:t>
+            </a:r>
+            <a:r>
+              <a:rPr lang="en-US" sz="1100" dirty="0">
+                <a:latin typeface="Menlo" panose="020B0609030804020204" pitchFamily="49" charset="0"/>
+                <a:ea typeface="Menlo" panose="020B0609030804020204" pitchFamily="49" charset="0"/>
+                <a:cs typeface="Menlo" panose="020B0609030804020204" pitchFamily="49" charset="0"/>
+              </a:rPr>
+              <a:t> for starting </a:t>
+            </a:r>
+            <a:r>
+              <a:rPr lang="en-US" sz="1100" dirty="0" err="1">
+                <a:latin typeface="Menlo" panose="020B0609030804020204" pitchFamily="49" charset="0"/>
+                <a:ea typeface="Menlo" panose="020B0609030804020204" pitchFamily="49" charset="0"/>
+                <a:cs typeface="Menlo" panose="020B0609030804020204" pitchFamily="49" charset="0"/>
+              </a:rPr>
+              <a:t>goal_tracker</a:t>
+            </a:r>
+            <a:endParaRPr lang="en-US" sz="1100" dirty="0">
+              <a:latin typeface="Menlo" panose="020B0609030804020204" pitchFamily="49" charset="0"/>
+              <a:ea typeface="Menlo" panose="020B0609030804020204" pitchFamily="49" charset="0"/>
+              <a:cs typeface="Menlo" panose="020B0609030804020204" pitchFamily="49" charset="0"/>
+            </a:endParaRPr>
+          </a:p>
+          <a:p>
+            <a:r>
+              <a:rPr lang="en-US" sz="1100" dirty="0">
+                <a:latin typeface="Menlo" panose="020B0609030804020204" pitchFamily="49" charset="0"/>
+                <a:ea typeface="Menlo" panose="020B0609030804020204" pitchFamily="49" charset="0"/>
+                <a:cs typeface="Menlo" panose="020B0609030804020204" pitchFamily="49" charset="0"/>
+              </a:rPr>
+              <a:t># </a:t>
+            </a:r>
+            <a:r>
+              <a:rPr lang="en-US" sz="1100" dirty="0" err="1">
+                <a:latin typeface="Menlo" panose="020B0609030804020204" pitchFamily="49" charset="0"/>
+                <a:ea typeface="Menlo" panose="020B0609030804020204" pitchFamily="49" charset="0"/>
+                <a:cs typeface="Menlo" panose="020B0609030804020204" pitchFamily="49" charset="0"/>
+              </a:rPr>
+              <a:t>systemd</a:t>
+            </a:r>
+            <a:r>
+              <a:rPr lang="en-US" sz="1100" dirty="0">
+                <a:latin typeface="Menlo" panose="020B0609030804020204" pitchFamily="49" charset="0"/>
+                <a:ea typeface="Menlo" panose="020B0609030804020204" pitchFamily="49" charset="0"/>
+                <a:cs typeface="Menlo" panose="020B0609030804020204" pitchFamily="49" charset="0"/>
+              </a:rPr>
+              <a:t> for auto restart of flask webhook listener</a:t>
+            </a:r>
+          </a:p>
+          <a:p>
+            <a:endParaRPr lang="en-US" sz="1200" dirty="0"/>
+          </a:p>
+        </p:txBody>
+      </p:sp>
+      <p:sp>
+        <p:nvSpPr>
+          <p:cNvPr id="45" name="Rectangle 44">
+            <a:extLst>
+              <a:ext uri="{FF2B5EF4-FFF2-40B4-BE49-F238E27FC236}">
+                <a16:creationId xmlns:a16="http://schemas.microsoft.com/office/drawing/2014/main" id="{0EAB98DF-52DE-AF5E-A17B-0ED949D2953C}"/>
               </a:ext>
             </a:extLst>
           </p:cNvPr>
@@ -4603,8 +4736,8 @@
         </p:nvSpPr>
         <p:spPr>
           <a:xfrm>
-            <a:off x="4396448" y="1054477"/>
-            <a:ext cx="3959950" cy="2270137"/>
+            <a:off x="76362" y="2108155"/>
+            <a:ext cx="1709249" cy="1465498"/>
           </a:xfrm>
           <a:prstGeom prst="rect">
             <a:avLst/>
@@ -4638,10 +4771,10 @@
       </p:sp>
       <p:pic>
         <p:nvPicPr>
-          <p:cNvPr id="1032" name="Picture 8" descr="File:Python Windows source code icon ...">
-            <a:extLst>
-              <a:ext uri="{FF2B5EF4-FFF2-40B4-BE49-F238E27FC236}">
-                <a16:creationId xmlns:a16="http://schemas.microsoft.com/office/drawing/2014/main" id="{363D7E83-158F-2C98-2A57-14BA8C83596F}"/>
+          <p:cNvPr id="2056" name="Picture 8" descr="Free Macos Logo Icon">
+            <a:extLst>
+              <a:ext uri="{FF2B5EF4-FFF2-40B4-BE49-F238E27FC236}">
+                <a16:creationId xmlns:a16="http://schemas.microsoft.com/office/drawing/2014/main" id="{91DE2241-AF9D-DCAB-89A0-46A2B1407EE8}"/>
               </a:ext>
             </a:extLst>
           </p:cNvPr>
@@ -4651,7 +4784,7 @@
           <p:nvPr/>
         </p:nvPicPr>
         <p:blipFill>
-          <a:blip r:embed="rId4">
+          <a:blip r:embed="rId12">
             <a:extLst>
               <a:ext uri="{28A0092B-C50C-407E-A947-70E740481C1C}">
                 <a14:useLocalDpi xmlns:a14="http://schemas.microsoft.com/office/drawing/2010/main" val="0"/>
@@ -4665,8 +4798,8 @@
         </p:blipFill>
         <p:spPr bwMode="auto">
           <a:xfrm>
-            <a:off x="6510447" y="1662866"/>
-            <a:ext cx="658282" cy="658282"/>
+            <a:off x="105332" y="1581349"/>
+            <a:ext cx="673414" cy="673414"/>
           </a:xfrm>
           <a:prstGeom prst="rect">
             <a:avLst/>
@@ -4683,1199 +4816,6 @@
           </a:extLst>
         </p:spPr>
       </p:pic>
-      <p:pic>
-        <p:nvPicPr>
-          <p:cNvPr id="1036" name="Picture 12" descr="2,900+ Red Emergency Light Stock Illustrations, Royalty-Free Vector  Graphics &amp; Clip Art - iStock | Red light, Siren, Alarm">
-            <a:extLst>
-              <a:ext uri="{FF2B5EF4-FFF2-40B4-BE49-F238E27FC236}">
-                <a16:creationId xmlns:a16="http://schemas.microsoft.com/office/drawing/2014/main" id="{BC84DD15-8866-53F7-C4F2-FEC358B636CA}"/>
-              </a:ext>
-            </a:extLst>
-          </p:cNvPr>
-          <p:cNvPicPr>
-            <a:picLocks noChangeAspect="1" noChangeArrowheads="1"/>
-          </p:cNvPicPr>
-          <p:nvPr/>
-        </p:nvPicPr>
-        <p:blipFill>
-          <a:blip r:embed="rId5">
-            <a:extLst>
-              <a:ext uri="{28A0092B-C50C-407E-A947-70E740481C1C}">
-                <a14:useLocalDpi xmlns:a14="http://schemas.microsoft.com/office/drawing/2010/main" val="0"/>
-              </a:ext>
-            </a:extLst>
-          </a:blip>
-          <a:srcRect/>
-          <a:stretch>
-            <a:fillRect/>
-          </a:stretch>
-        </p:blipFill>
-        <p:spPr bwMode="auto">
-          <a:xfrm flipH="1">
-            <a:off x="10740141" y="2189545"/>
-            <a:ext cx="862670" cy="862670"/>
-          </a:xfrm>
-          <a:prstGeom prst="rect">
-            <a:avLst/>
-          </a:prstGeom>
-          <a:noFill/>
-          <a:extLst>
-            <a:ext uri="{909E8E84-426E-40DD-AFC4-6F175D3DCCD1}">
-              <a14:hiddenFill xmlns:a14="http://schemas.microsoft.com/office/drawing/2010/main">
-                <a:solidFill>
-                  <a:srgbClr val="FFFFFF"/>
-                </a:solidFill>
-              </a14:hiddenFill>
-            </a:ext>
-          </a:extLst>
-        </p:spPr>
-      </p:pic>
-      <p:pic>
-        <p:nvPicPr>
-          <p:cNvPr id="1040" name="Picture 16" descr="WEBHOOK">
-            <a:extLst>
-              <a:ext uri="{FF2B5EF4-FFF2-40B4-BE49-F238E27FC236}">
-                <a16:creationId xmlns:a16="http://schemas.microsoft.com/office/drawing/2014/main" id="{C5E8B57A-E36A-F8DF-0CBA-E6BA4954D1C7}"/>
-              </a:ext>
-            </a:extLst>
-          </p:cNvPr>
-          <p:cNvPicPr>
-            <a:picLocks noChangeAspect="1" noChangeArrowheads="1"/>
-          </p:cNvPicPr>
-          <p:nvPr/>
-        </p:nvPicPr>
-        <p:blipFill>
-          <a:blip r:embed="rId6">
-            <a:extLst>
-              <a:ext uri="{28A0092B-C50C-407E-A947-70E740481C1C}">
-                <a14:useLocalDpi xmlns:a14="http://schemas.microsoft.com/office/drawing/2010/main" val="0"/>
-              </a:ext>
-            </a:extLst>
-          </a:blip>
-          <a:srcRect/>
-          <a:stretch>
-            <a:fillRect/>
-          </a:stretch>
-        </p:blipFill>
-        <p:spPr bwMode="auto">
-          <a:xfrm>
-            <a:off x="4463904" y="1959378"/>
-            <a:ext cx="1053789" cy="702526"/>
-          </a:xfrm>
-          <a:prstGeom prst="rect">
-            <a:avLst/>
-          </a:prstGeom>
-          <a:noFill/>
-          <a:extLst>
-            <a:ext uri="{909E8E84-426E-40DD-AFC4-6F175D3DCCD1}">
-              <a14:hiddenFill xmlns:a14="http://schemas.microsoft.com/office/drawing/2010/main">
-                <a:solidFill>
-                  <a:srgbClr val="FFFFFF"/>
-                </a:solidFill>
-              </a14:hiddenFill>
-            </a:ext>
-          </a:extLst>
-        </p:spPr>
-      </p:pic>
-      <p:pic>
-        <p:nvPicPr>
-          <p:cNvPr id="8" name="Picture 16" descr="WEBHOOK">
-            <a:extLst>
-              <a:ext uri="{FF2B5EF4-FFF2-40B4-BE49-F238E27FC236}">
-                <a16:creationId xmlns:a16="http://schemas.microsoft.com/office/drawing/2014/main" id="{BAD942DC-1082-A867-6455-07B159869484}"/>
-              </a:ext>
-            </a:extLst>
-          </p:cNvPr>
-          <p:cNvPicPr>
-            <a:picLocks noChangeAspect="1" noChangeArrowheads="1"/>
-          </p:cNvPicPr>
-          <p:nvPr/>
-        </p:nvPicPr>
-        <p:blipFill>
-          <a:blip r:embed="rId6">
-            <a:extLst>
-              <a:ext uri="{28A0092B-C50C-407E-A947-70E740481C1C}">
-                <a14:useLocalDpi xmlns:a14="http://schemas.microsoft.com/office/drawing/2010/main" val="0"/>
-              </a:ext>
-            </a:extLst>
-          </a:blip>
-          <a:srcRect/>
-          <a:stretch>
-            <a:fillRect/>
-          </a:stretch>
-        </p:blipFill>
-        <p:spPr bwMode="auto">
-          <a:xfrm>
-            <a:off x="6428321" y="4642143"/>
-            <a:ext cx="1053789" cy="702526"/>
-          </a:xfrm>
-          <a:prstGeom prst="rect">
-            <a:avLst/>
-          </a:prstGeom>
-          <a:noFill/>
-          <a:extLst>
-            <a:ext uri="{909E8E84-426E-40DD-AFC4-6F175D3DCCD1}">
-              <a14:hiddenFill xmlns:a14="http://schemas.microsoft.com/office/drawing/2010/main">
-                <a:solidFill>
-                  <a:srgbClr val="FFFFFF"/>
-                </a:solidFill>
-              </a14:hiddenFill>
-            </a:ext>
-          </a:extLst>
-        </p:spPr>
-      </p:pic>
-      <p:pic>
-        <p:nvPicPr>
-          <p:cNvPr id="1042" name="Picture 18" descr="Smart Plug icons for free download | Freepik">
-            <a:extLst>
-              <a:ext uri="{FF2B5EF4-FFF2-40B4-BE49-F238E27FC236}">
-                <a16:creationId xmlns:a16="http://schemas.microsoft.com/office/drawing/2014/main" id="{240B102B-AF1A-1B56-0AA0-FCBE5475D3EC}"/>
-              </a:ext>
-            </a:extLst>
-          </p:cNvPr>
-          <p:cNvPicPr>
-            <a:picLocks noChangeAspect="1" noChangeArrowheads="1"/>
-          </p:cNvPicPr>
-          <p:nvPr/>
-        </p:nvPicPr>
-        <p:blipFill>
-          <a:blip r:embed="rId7">
-            <a:extLst>
-              <a:ext uri="{28A0092B-C50C-407E-A947-70E740481C1C}">
-                <a14:useLocalDpi xmlns:a14="http://schemas.microsoft.com/office/drawing/2010/main" val="0"/>
-              </a:ext>
-            </a:extLst>
-          </a:blip>
-          <a:srcRect/>
-          <a:stretch>
-            <a:fillRect/>
-          </a:stretch>
-        </p:blipFill>
-        <p:spPr bwMode="auto">
-          <a:xfrm>
-            <a:off x="9290874" y="3429000"/>
-            <a:ext cx="992459" cy="992459"/>
-          </a:xfrm>
-          <a:prstGeom prst="rect">
-            <a:avLst/>
-          </a:prstGeom>
-          <a:noFill/>
-          <a:extLst>
-            <a:ext uri="{909E8E84-426E-40DD-AFC4-6F175D3DCCD1}">
-              <a14:hiddenFill xmlns:a14="http://schemas.microsoft.com/office/drawing/2010/main">
-                <a:solidFill>
-                  <a:srgbClr val="FFFFFF"/>
-                </a:solidFill>
-              </a14:hiddenFill>
-            </a:ext>
-          </a:extLst>
-        </p:spPr>
-      </p:pic>
-      <p:sp>
-        <p:nvSpPr>
-          <p:cNvPr id="9" name="Rectangle 8">
-            <a:extLst>
-              <a:ext uri="{FF2B5EF4-FFF2-40B4-BE49-F238E27FC236}">
-                <a16:creationId xmlns:a16="http://schemas.microsoft.com/office/drawing/2014/main" id="{B0BD1831-0FD9-A18A-E49E-23445B1EECB1}"/>
-              </a:ext>
-            </a:extLst>
-          </p:cNvPr>
-          <p:cNvSpPr/>
-          <p:nvPr/>
-        </p:nvSpPr>
-        <p:spPr>
-          <a:xfrm>
-            <a:off x="4435789" y="4131247"/>
-            <a:ext cx="3245006" cy="2270137"/>
-          </a:xfrm>
-          <a:prstGeom prst="rect">
-            <a:avLst/>
-          </a:prstGeom>
-          <a:noFill/>
-        </p:spPr>
-        <p:style>
-          <a:lnRef idx="2">
-            <a:schemeClr val="accent1">
-              <a:shade val="15000"/>
-            </a:schemeClr>
-          </a:lnRef>
-          <a:fillRef idx="1">
-            <a:schemeClr val="accent1"/>
-          </a:fillRef>
-          <a:effectRef idx="0">
-            <a:schemeClr val="accent1"/>
-          </a:effectRef>
-          <a:fontRef idx="minor">
-            <a:schemeClr val="lt1"/>
-          </a:fontRef>
-        </p:style>
-        <p:txBody>
-          <a:bodyPr rtlCol="0" anchor="ctr"/>
-          <a:lstStyle/>
-          <a:p>
-            <a:pPr algn="ctr"/>
-            <a:endParaRPr lang="en-US"/>
-          </a:p>
-        </p:txBody>
-      </p:sp>
-      <p:pic>
-        <p:nvPicPr>
-          <p:cNvPr id="10" name="Picture 9">
-            <a:extLst>
-              <a:ext uri="{FF2B5EF4-FFF2-40B4-BE49-F238E27FC236}">
-                <a16:creationId xmlns:a16="http://schemas.microsoft.com/office/drawing/2014/main" id="{5E8A36DE-25DC-ED64-362A-E7699C1CF213}"/>
-              </a:ext>
-            </a:extLst>
-          </p:cNvPr>
-          <p:cNvPicPr>
-            <a:picLocks noChangeAspect="1"/>
-          </p:cNvPicPr>
-          <p:nvPr/>
-        </p:nvPicPr>
-        <p:blipFill>
-          <a:blip r:embed="rId8"/>
-          <a:stretch>
-            <a:fillRect/>
-          </a:stretch>
-        </p:blipFill>
-        <p:spPr>
-          <a:xfrm>
-            <a:off x="4914122" y="4634950"/>
-            <a:ext cx="628034" cy="645008"/>
-          </a:xfrm>
-          <a:prstGeom prst="rect">
-            <a:avLst/>
-          </a:prstGeom>
-        </p:spPr>
-      </p:pic>
-      <p:sp>
-        <p:nvSpPr>
-          <p:cNvPr id="11" name="TextBox 10">
-            <a:extLst>
-              <a:ext uri="{FF2B5EF4-FFF2-40B4-BE49-F238E27FC236}">
-                <a16:creationId xmlns:a16="http://schemas.microsoft.com/office/drawing/2014/main" id="{4A2E8CBD-EEAA-889B-96A3-3C194BA97A4A}"/>
-              </a:ext>
-            </a:extLst>
-          </p:cNvPr>
-          <p:cNvSpPr txBox="1"/>
-          <p:nvPr/>
-        </p:nvSpPr>
-        <p:spPr>
-          <a:xfrm>
-            <a:off x="2543162" y="5028227"/>
-            <a:ext cx="1532920" cy="276999"/>
-          </a:xfrm>
-          <a:prstGeom prst="rect">
-            <a:avLst/>
-          </a:prstGeom>
-          <a:noFill/>
-        </p:spPr>
-        <p:txBody>
-          <a:bodyPr wrap="none" rtlCol="0">
-            <a:spAutoFit/>
-          </a:bodyPr>
-          <a:lstStyle/>
-          <a:p>
-            <a:r>
-              <a:rPr lang="en-US" sz="1200" dirty="0"/>
-              <a:t>Listen for git commits</a:t>
-            </a:r>
-          </a:p>
-        </p:txBody>
-      </p:sp>
-      <p:cxnSp>
-        <p:nvCxnSpPr>
-          <p:cNvPr id="13" name="Elbow Connector 12">
-            <a:extLst>
-              <a:ext uri="{FF2B5EF4-FFF2-40B4-BE49-F238E27FC236}">
-                <a16:creationId xmlns:a16="http://schemas.microsoft.com/office/drawing/2014/main" id="{F6D6C20A-90DF-B55E-BCE8-29CFF38CA4A7}"/>
-              </a:ext>
-            </a:extLst>
-          </p:cNvPr>
-          <p:cNvCxnSpPr>
-            <a:cxnSpLocks/>
-            <a:stCxn id="1026" idx="2"/>
-            <a:endCxn id="10" idx="1"/>
-          </p:cNvCxnSpPr>
-          <p:nvPr/>
-        </p:nvCxnSpPr>
-        <p:spPr>
-          <a:xfrm rot="16200000" flipH="1">
-            <a:off x="2979733" y="3023065"/>
-            <a:ext cx="1899708" cy="1969070"/>
-          </a:xfrm>
-          <a:prstGeom prst="bentConnector2">
-            <a:avLst/>
-          </a:prstGeom>
-          <a:ln>
-            <a:tailEnd type="triangle"/>
-          </a:ln>
-        </p:spPr>
-        <p:style>
-          <a:lnRef idx="1">
-            <a:schemeClr val="accent1"/>
-          </a:lnRef>
-          <a:fillRef idx="0">
-            <a:schemeClr val="accent1"/>
-          </a:fillRef>
-          <a:effectRef idx="0">
-            <a:schemeClr val="accent1"/>
-          </a:effectRef>
-          <a:fontRef idx="minor">
-            <a:schemeClr val="tx1"/>
-          </a:fontRef>
-        </p:style>
-      </p:cxnSp>
-      <p:sp>
-        <p:nvSpPr>
-          <p:cNvPr id="15" name="TextBox 14">
-            <a:extLst>
-              <a:ext uri="{FF2B5EF4-FFF2-40B4-BE49-F238E27FC236}">
-                <a16:creationId xmlns:a16="http://schemas.microsoft.com/office/drawing/2014/main" id="{7A1AF8DE-C853-281B-88AE-318275ABA8AC}"/>
-              </a:ext>
-            </a:extLst>
-          </p:cNvPr>
-          <p:cNvSpPr txBox="1"/>
-          <p:nvPr/>
-        </p:nvSpPr>
-        <p:spPr>
-          <a:xfrm>
-            <a:off x="5363516" y="3545194"/>
-            <a:ext cx="1097765" cy="461665"/>
-          </a:xfrm>
-          <a:prstGeom prst="rect">
-            <a:avLst/>
-          </a:prstGeom>
-          <a:noFill/>
-        </p:spPr>
-        <p:txBody>
-          <a:bodyPr wrap="square" rtlCol="0">
-            <a:spAutoFit/>
-          </a:bodyPr>
-          <a:lstStyle/>
-          <a:p>
-            <a:r>
-              <a:rPr lang="en-US" sz="1200" dirty="0"/>
-              <a:t>Call webhook to pull latest</a:t>
-            </a:r>
-          </a:p>
-        </p:txBody>
-      </p:sp>
-      <p:cxnSp>
-        <p:nvCxnSpPr>
-          <p:cNvPr id="16" name="Elbow Connector 15">
-            <a:extLst>
-              <a:ext uri="{FF2B5EF4-FFF2-40B4-BE49-F238E27FC236}">
-                <a16:creationId xmlns:a16="http://schemas.microsoft.com/office/drawing/2014/main" id="{F9FCD82D-C529-8950-12DD-9C369AC3BBD9}"/>
-              </a:ext>
-            </a:extLst>
-          </p:cNvPr>
-          <p:cNvCxnSpPr>
-            <a:cxnSpLocks/>
-            <a:stCxn id="10" idx="0"/>
-            <a:endCxn id="1040" idx="2"/>
-          </p:cNvCxnSpPr>
-          <p:nvPr/>
-        </p:nvCxnSpPr>
-        <p:spPr>
-          <a:xfrm rot="16200000" flipV="1">
-            <a:off x="4122946" y="3529757"/>
-            <a:ext cx="1973046" cy="237340"/>
-          </a:xfrm>
-          <a:prstGeom prst="bentConnector3">
-            <a:avLst>
-              <a:gd name="adj1" fmla="val 50000"/>
-            </a:avLst>
-          </a:prstGeom>
-          <a:ln>
-            <a:tailEnd type="triangle"/>
-          </a:ln>
-        </p:spPr>
-        <p:style>
-          <a:lnRef idx="1">
-            <a:schemeClr val="accent1"/>
-          </a:lnRef>
-          <a:fillRef idx="0">
-            <a:schemeClr val="accent1"/>
-          </a:fillRef>
-          <a:effectRef idx="0">
-            <a:schemeClr val="accent1"/>
-          </a:effectRef>
-          <a:fontRef idx="minor">
-            <a:schemeClr val="tx1"/>
-          </a:fontRef>
-        </p:style>
-      </p:cxnSp>
-      <p:cxnSp>
-        <p:nvCxnSpPr>
-          <p:cNvPr id="19" name="Elbow Connector 18">
-            <a:extLst>
-              <a:ext uri="{FF2B5EF4-FFF2-40B4-BE49-F238E27FC236}">
-                <a16:creationId xmlns:a16="http://schemas.microsoft.com/office/drawing/2014/main" id="{D7258494-F6E6-23C5-5FDD-7BB1E7E41B58}"/>
-              </a:ext>
-            </a:extLst>
-          </p:cNvPr>
-          <p:cNvCxnSpPr>
-            <a:cxnSpLocks/>
-            <a:stCxn id="1040" idx="0"/>
-            <a:endCxn id="1032" idx="1"/>
-          </p:cNvCxnSpPr>
-          <p:nvPr/>
-        </p:nvCxnSpPr>
-        <p:spPr>
-          <a:xfrm rot="16200000" flipH="1">
-            <a:off x="5734308" y="1215868"/>
-            <a:ext cx="32629" cy="1519648"/>
-          </a:xfrm>
-          <a:prstGeom prst="bentConnector4">
-            <a:avLst>
-              <a:gd name="adj1" fmla="val -700604"/>
-              <a:gd name="adj2" fmla="val 67336"/>
-            </a:avLst>
-          </a:prstGeom>
-          <a:ln>
-            <a:tailEnd type="triangle"/>
-          </a:ln>
-        </p:spPr>
-        <p:style>
-          <a:lnRef idx="1">
-            <a:schemeClr val="accent1"/>
-          </a:lnRef>
-          <a:fillRef idx="0">
-            <a:schemeClr val="accent1"/>
-          </a:fillRef>
-          <a:effectRef idx="0">
-            <a:schemeClr val="accent1"/>
-          </a:effectRef>
-          <a:fontRef idx="minor">
-            <a:schemeClr val="tx1"/>
-          </a:fontRef>
-        </p:style>
-      </p:cxnSp>
-      <p:sp>
-        <p:nvSpPr>
-          <p:cNvPr id="22" name="TextBox 21">
-            <a:extLst>
-              <a:ext uri="{FF2B5EF4-FFF2-40B4-BE49-F238E27FC236}">
-                <a16:creationId xmlns:a16="http://schemas.microsoft.com/office/drawing/2014/main" id="{9193C5CC-32F8-18ED-87E1-328CDC281DFB}"/>
-              </a:ext>
-            </a:extLst>
-          </p:cNvPr>
-          <p:cNvSpPr txBox="1"/>
-          <p:nvPr/>
-        </p:nvSpPr>
-        <p:spPr>
-          <a:xfrm>
-            <a:off x="5379848" y="2034081"/>
-            <a:ext cx="1097765" cy="830997"/>
-          </a:xfrm>
-          <a:prstGeom prst="rect">
-            <a:avLst/>
-          </a:prstGeom>
-          <a:noFill/>
-        </p:spPr>
-        <p:txBody>
-          <a:bodyPr wrap="square" rtlCol="0">
-            <a:spAutoFit/>
-          </a:bodyPr>
-          <a:lstStyle/>
-          <a:p>
-            <a:r>
-              <a:rPr lang="en-US" sz="1200" dirty="0"/>
-              <a:t>Update script; kill existing process, restart</a:t>
-            </a:r>
-          </a:p>
-        </p:txBody>
-      </p:sp>
-      <p:cxnSp>
-        <p:nvCxnSpPr>
-          <p:cNvPr id="27" name="Elbow Connector 26">
-            <a:extLst>
-              <a:ext uri="{FF2B5EF4-FFF2-40B4-BE49-F238E27FC236}">
-                <a16:creationId xmlns:a16="http://schemas.microsoft.com/office/drawing/2014/main" id="{A473AC81-EDC7-FC33-46FD-33E369028E8C}"/>
-              </a:ext>
-            </a:extLst>
-          </p:cNvPr>
-          <p:cNvCxnSpPr>
-            <a:cxnSpLocks/>
-            <a:stCxn id="1032" idx="2"/>
-            <a:endCxn id="8" idx="0"/>
-          </p:cNvCxnSpPr>
-          <p:nvPr/>
-        </p:nvCxnSpPr>
-        <p:spPr>
-          <a:xfrm rot="16200000" flipH="1">
-            <a:off x="5736905" y="3423831"/>
-            <a:ext cx="2320995" cy="115628"/>
-          </a:xfrm>
-          <a:prstGeom prst="bentConnector3">
-            <a:avLst>
-              <a:gd name="adj1" fmla="val 50000"/>
-            </a:avLst>
-          </a:prstGeom>
-          <a:ln>
-            <a:tailEnd type="triangle"/>
-          </a:ln>
-        </p:spPr>
-        <p:style>
-          <a:lnRef idx="1">
-            <a:schemeClr val="accent1"/>
-          </a:lnRef>
-          <a:fillRef idx="0">
-            <a:schemeClr val="accent1"/>
-          </a:fillRef>
-          <a:effectRef idx="0">
-            <a:schemeClr val="accent1"/>
-          </a:effectRef>
-          <a:fontRef idx="minor">
-            <a:schemeClr val="tx1"/>
-          </a:fontRef>
-        </p:style>
-      </p:cxnSp>
-      <p:sp>
-        <p:nvSpPr>
-          <p:cNvPr id="30" name="TextBox 29">
-            <a:extLst>
-              <a:ext uri="{FF2B5EF4-FFF2-40B4-BE49-F238E27FC236}">
-                <a16:creationId xmlns:a16="http://schemas.microsoft.com/office/drawing/2014/main" id="{3A4F21B4-2ECC-3373-B58B-6A45300AF380}"/>
-              </a:ext>
-            </a:extLst>
-          </p:cNvPr>
-          <p:cNvSpPr txBox="1"/>
-          <p:nvPr/>
-        </p:nvSpPr>
-        <p:spPr>
-          <a:xfrm>
-            <a:off x="6428321" y="1032950"/>
-            <a:ext cx="1097765" cy="646331"/>
-          </a:xfrm>
-          <a:prstGeom prst="rect">
-            <a:avLst/>
-          </a:prstGeom>
-          <a:noFill/>
-        </p:spPr>
-        <p:txBody>
-          <a:bodyPr wrap="square" rtlCol="0">
-            <a:spAutoFit/>
-          </a:bodyPr>
-          <a:lstStyle/>
-          <a:p>
-            <a:r>
-              <a:rPr lang="en-US" sz="1200" dirty="0"/>
-              <a:t>Monitor games for goals</a:t>
-            </a:r>
-          </a:p>
-        </p:txBody>
-      </p:sp>
-      <p:sp>
-        <p:nvSpPr>
-          <p:cNvPr id="31" name="TextBox 30">
-            <a:extLst>
-              <a:ext uri="{FF2B5EF4-FFF2-40B4-BE49-F238E27FC236}">
-                <a16:creationId xmlns:a16="http://schemas.microsoft.com/office/drawing/2014/main" id="{C532CE4B-0189-3359-F991-0BB5048E30A4}"/>
-              </a:ext>
-            </a:extLst>
-          </p:cNvPr>
-          <p:cNvSpPr txBox="1"/>
-          <p:nvPr/>
-        </p:nvSpPr>
-        <p:spPr>
-          <a:xfrm>
-            <a:off x="6969034" y="2256912"/>
-            <a:ext cx="1265734" cy="830997"/>
-          </a:xfrm>
-          <a:prstGeom prst="rect">
-            <a:avLst/>
-          </a:prstGeom>
-          <a:noFill/>
-        </p:spPr>
-        <p:txBody>
-          <a:bodyPr wrap="square" rtlCol="0">
-            <a:spAutoFit/>
-          </a:bodyPr>
-          <a:lstStyle/>
-          <a:p>
-            <a:r>
-              <a:rPr lang="en-US" sz="1200" dirty="0"/>
-              <a:t>Call automation via webhook when goal scored</a:t>
-            </a:r>
-          </a:p>
-        </p:txBody>
-      </p:sp>
-      <p:cxnSp>
-        <p:nvCxnSpPr>
-          <p:cNvPr id="32" name="Elbow Connector 31">
-            <a:extLst>
-              <a:ext uri="{FF2B5EF4-FFF2-40B4-BE49-F238E27FC236}">
-                <a16:creationId xmlns:a16="http://schemas.microsoft.com/office/drawing/2014/main" id="{00428819-1ED3-54D0-E32C-2D3556AF618D}"/>
-              </a:ext>
-            </a:extLst>
-          </p:cNvPr>
-          <p:cNvCxnSpPr>
-            <a:cxnSpLocks/>
-            <a:stCxn id="8" idx="3"/>
-            <a:endCxn id="1042" idx="1"/>
-          </p:cNvCxnSpPr>
-          <p:nvPr/>
-        </p:nvCxnSpPr>
-        <p:spPr>
-          <a:xfrm flipV="1">
-            <a:off x="7482110" y="3925230"/>
-            <a:ext cx="1808764" cy="1068176"/>
-          </a:xfrm>
-          <a:prstGeom prst="bentConnector3">
-            <a:avLst>
-              <a:gd name="adj1" fmla="val 50000"/>
-            </a:avLst>
-          </a:prstGeom>
-          <a:ln>
-            <a:tailEnd type="triangle"/>
-          </a:ln>
-        </p:spPr>
-        <p:style>
-          <a:lnRef idx="1">
-            <a:schemeClr val="accent1"/>
-          </a:lnRef>
-          <a:fillRef idx="0">
-            <a:schemeClr val="accent1"/>
-          </a:fillRef>
-          <a:effectRef idx="0">
-            <a:schemeClr val="accent1"/>
-          </a:effectRef>
-          <a:fontRef idx="minor">
-            <a:schemeClr val="tx1"/>
-          </a:fontRef>
-        </p:style>
-      </p:cxnSp>
-      <p:sp>
-        <p:nvSpPr>
-          <p:cNvPr id="35" name="TextBox 34">
-            <a:extLst>
-              <a:ext uri="{FF2B5EF4-FFF2-40B4-BE49-F238E27FC236}">
-                <a16:creationId xmlns:a16="http://schemas.microsoft.com/office/drawing/2014/main" id="{61CA7906-47D5-6C7B-81F4-489B4AC383C9}"/>
-              </a:ext>
-            </a:extLst>
-          </p:cNvPr>
-          <p:cNvSpPr txBox="1"/>
-          <p:nvPr/>
-        </p:nvSpPr>
-        <p:spPr>
-          <a:xfrm>
-            <a:off x="8356397" y="4612728"/>
-            <a:ext cx="1461369" cy="276999"/>
-          </a:xfrm>
-          <a:prstGeom prst="rect">
-            <a:avLst/>
-          </a:prstGeom>
-          <a:noFill/>
-        </p:spPr>
-        <p:txBody>
-          <a:bodyPr wrap="square" rtlCol="0">
-            <a:spAutoFit/>
-          </a:bodyPr>
-          <a:lstStyle/>
-          <a:p>
-            <a:r>
-              <a:rPr lang="en-US" sz="1200" dirty="0"/>
-              <a:t>Toggle  smart switch</a:t>
-            </a:r>
-          </a:p>
-        </p:txBody>
-      </p:sp>
-      <p:cxnSp>
-        <p:nvCxnSpPr>
-          <p:cNvPr id="36" name="Elbow Connector 35">
-            <a:extLst>
-              <a:ext uri="{FF2B5EF4-FFF2-40B4-BE49-F238E27FC236}">
-                <a16:creationId xmlns:a16="http://schemas.microsoft.com/office/drawing/2014/main" id="{C4BB49C2-F677-4B1B-CCC6-8C16382577EC}"/>
-              </a:ext>
-            </a:extLst>
-          </p:cNvPr>
-          <p:cNvCxnSpPr>
-            <a:cxnSpLocks/>
-            <a:stCxn id="1042" idx="3"/>
-            <a:endCxn id="1036" idx="3"/>
-          </p:cNvCxnSpPr>
-          <p:nvPr/>
-        </p:nvCxnSpPr>
-        <p:spPr>
-          <a:xfrm flipV="1">
-            <a:off x="10283333" y="2620880"/>
-            <a:ext cx="456808" cy="1304350"/>
-          </a:xfrm>
-          <a:prstGeom prst="bentConnector3">
-            <a:avLst>
-              <a:gd name="adj1" fmla="val 50000"/>
-            </a:avLst>
-          </a:prstGeom>
-          <a:ln>
-            <a:tailEnd type="triangle"/>
-          </a:ln>
-        </p:spPr>
-        <p:style>
-          <a:lnRef idx="1">
-            <a:schemeClr val="accent1"/>
-          </a:lnRef>
-          <a:fillRef idx="0">
-            <a:schemeClr val="accent1"/>
-          </a:fillRef>
-          <a:effectRef idx="0">
-            <a:schemeClr val="accent1"/>
-          </a:effectRef>
-          <a:fontRef idx="minor">
-            <a:schemeClr val="tx1"/>
-          </a:fontRef>
-        </p:style>
-      </p:cxnSp>
-      <p:sp>
-        <p:nvSpPr>
-          <p:cNvPr id="42" name="TextBox 41">
-            <a:extLst>
-              <a:ext uri="{FF2B5EF4-FFF2-40B4-BE49-F238E27FC236}">
-                <a16:creationId xmlns:a16="http://schemas.microsoft.com/office/drawing/2014/main" id="{80B43EAE-95CF-AA8E-C85E-8E524DB4C601}"/>
-              </a:ext>
-            </a:extLst>
-          </p:cNvPr>
-          <p:cNvSpPr txBox="1"/>
-          <p:nvPr/>
-        </p:nvSpPr>
-        <p:spPr>
-          <a:xfrm>
-            <a:off x="10614592" y="2984483"/>
-            <a:ext cx="1265734" cy="276999"/>
-          </a:xfrm>
-          <a:prstGeom prst="rect">
-            <a:avLst/>
-          </a:prstGeom>
-          <a:noFill/>
-        </p:spPr>
-        <p:txBody>
-          <a:bodyPr wrap="square" rtlCol="0">
-            <a:spAutoFit/>
-          </a:bodyPr>
-          <a:lstStyle/>
-          <a:p>
-            <a:r>
-              <a:rPr lang="en-US" sz="1200" dirty="0"/>
-              <a:t>Flash goal light</a:t>
-            </a:r>
-          </a:p>
-        </p:txBody>
-      </p:sp>
-      <p:pic>
-        <p:nvPicPr>
-          <p:cNvPr id="1038" name="Picture 14" descr="A refreshed logo for Home Assistant! - Home Assistant">
-            <a:extLst>
-              <a:ext uri="{FF2B5EF4-FFF2-40B4-BE49-F238E27FC236}">
-                <a16:creationId xmlns:a16="http://schemas.microsoft.com/office/drawing/2014/main" id="{8E44643C-8363-F92A-80B6-F33B5F8B31F4}"/>
-              </a:ext>
-            </a:extLst>
-          </p:cNvPr>
-          <p:cNvPicPr>
-            <a:picLocks noChangeAspect="1" noChangeArrowheads="1"/>
-          </p:cNvPicPr>
-          <p:nvPr/>
-        </p:nvPicPr>
-        <p:blipFill>
-          <a:blip r:embed="rId9">
-            <a:extLst>
-              <a:ext uri="{28A0092B-C50C-407E-A947-70E740481C1C}">
-                <a14:useLocalDpi xmlns:a14="http://schemas.microsoft.com/office/drawing/2010/main" val="0"/>
-              </a:ext>
-            </a:extLst>
-          </a:blip>
-          <a:srcRect/>
-          <a:stretch>
-            <a:fillRect/>
-          </a:stretch>
-        </p:blipFill>
-        <p:spPr bwMode="auto">
-          <a:xfrm>
-            <a:off x="4148492" y="3845380"/>
-            <a:ext cx="579863" cy="579863"/>
-          </a:xfrm>
-          <a:prstGeom prst="rect">
-            <a:avLst/>
-          </a:prstGeom>
-          <a:noFill/>
-          <a:extLst>
-            <a:ext uri="{909E8E84-426E-40DD-AFC4-6F175D3DCCD1}">
-              <a14:hiddenFill xmlns:a14="http://schemas.microsoft.com/office/drawing/2010/main">
-                <a:solidFill>
-                  <a:srgbClr val="FFFFFF"/>
-                </a:solidFill>
-              </a14:hiddenFill>
-            </a:ext>
-          </a:extLst>
-        </p:spPr>
-      </p:pic>
-      <p:cxnSp>
-        <p:nvCxnSpPr>
-          <p:cNvPr id="43" name="Elbow Connector 42">
-            <a:extLst>
-              <a:ext uri="{FF2B5EF4-FFF2-40B4-BE49-F238E27FC236}">
-                <a16:creationId xmlns:a16="http://schemas.microsoft.com/office/drawing/2014/main" id="{38257588-A557-5EB0-40B6-B0821F5BEEF8}"/>
-              </a:ext>
-            </a:extLst>
-          </p:cNvPr>
-          <p:cNvCxnSpPr>
-            <a:cxnSpLocks/>
-            <a:stCxn id="1028" idx="3"/>
-            <a:endCxn id="1026" idx="1"/>
-          </p:cNvCxnSpPr>
-          <p:nvPr/>
-        </p:nvCxnSpPr>
-        <p:spPr>
-          <a:xfrm>
-            <a:off x="1409717" y="2804132"/>
-            <a:ext cx="1051496" cy="11695"/>
-          </a:xfrm>
-          <a:prstGeom prst="bentConnector3">
-            <a:avLst>
-              <a:gd name="adj1" fmla="val 50000"/>
-            </a:avLst>
-          </a:prstGeom>
-          <a:ln>
-            <a:tailEnd type="triangle"/>
-          </a:ln>
-        </p:spPr>
-        <p:style>
-          <a:lnRef idx="1">
-            <a:schemeClr val="accent1"/>
-          </a:lnRef>
-          <a:fillRef idx="0">
-            <a:schemeClr val="accent1"/>
-          </a:fillRef>
-          <a:effectRef idx="0">
-            <a:schemeClr val="accent1"/>
-          </a:effectRef>
-          <a:fontRef idx="minor">
-            <a:schemeClr val="tx1"/>
-          </a:fontRef>
-        </p:style>
-      </p:cxnSp>
-      <p:sp>
-        <p:nvSpPr>
-          <p:cNvPr id="51" name="TextBox 50">
-            <a:extLst>
-              <a:ext uri="{FF2B5EF4-FFF2-40B4-BE49-F238E27FC236}">
-                <a16:creationId xmlns:a16="http://schemas.microsoft.com/office/drawing/2014/main" id="{EAABB2A4-A8A7-F3A4-D1E6-1240470B3254}"/>
-              </a:ext>
-            </a:extLst>
-          </p:cNvPr>
-          <p:cNvSpPr txBox="1"/>
-          <p:nvPr/>
-        </p:nvSpPr>
-        <p:spPr>
-          <a:xfrm>
-            <a:off x="1296417" y="2330313"/>
-            <a:ext cx="1522468" cy="276999"/>
-          </a:xfrm>
-          <a:prstGeom prst="rect">
-            <a:avLst/>
-          </a:prstGeom>
-          <a:noFill/>
-        </p:spPr>
-        <p:txBody>
-          <a:bodyPr wrap="none" rtlCol="0">
-            <a:spAutoFit/>
-          </a:bodyPr>
-          <a:lstStyle/>
-          <a:p>
-            <a:r>
-              <a:rPr lang="en-US" sz="1200" dirty="0"/>
-              <a:t>Code sync’d to </a:t>
-            </a:r>
-            <a:r>
-              <a:rPr lang="en-US" sz="1200" dirty="0" err="1"/>
-              <a:t>github</a:t>
-            </a:r>
-            <a:endParaRPr lang="en-US" sz="1200" dirty="0"/>
-          </a:p>
-        </p:txBody>
-      </p:sp>
-      <p:pic>
-        <p:nvPicPr>
-          <p:cNvPr id="2050" name="Picture 2" descr="Download Raspberry Pi Logo in SVG Vector or PNG File Format ...">
-            <a:extLst>
-              <a:ext uri="{FF2B5EF4-FFF2-40B4-BE49-F238E27FC236}">
-                <a16:creationId xmlns:a16="http://schemas.microsoft.com/office/drawing/2014/main" id="{5BB0CDAF-B078-76D8-D5EA-BD3D7A6FD400}"/>
-              </a:ext>
-            </a:extLst>
-          </p:cNvPr>
-          <p:cNvPicPr>
-            <a:picLocks noChangeAspect="1" noChangeArrowheads="1"/>
-          </p:cNvPicPr>
-          <p:nvPr/>
-        </p:nvPicPr>
-        <p:blipFill>
-          <a:blip r:embed="rId10">
-            <a:extLst>
-              <a:ext uri="{28A0092B-C50C-407E-A947-70E740481C1C}">
-                <a14:useLocalDpi xmlns:a14="http://schemas.microsoft.com/office/drawing/2010/main" val="0"/>
-              </a:ext>
-            </a:extLst>
-          </a:blip>
-          <a:srcRect/>
-          <a:stretch>
-            <a:fillRect/>
-          </a:stretch>
-        </p:blipFill>
-        <p:spPr bwMode="auto">
-          <a:xfrm>
-            <a:off x="3716671" y="540147"/>
-            <a:ext cx="1350803" cy="900535"/>
-          </a:xfrm>
-          <a:prstGeom prst="rect">
-            <a:avLst/>
-          </a:prstGeom>
-          <a:noFill/>
-          <a:extLst>
-            <a:ext uri="{909E8E84-426E-40DD-AFC4-6F175D3DCCD1}">
-              <a14:hiddenFill xmlns:a14="http://schemas.microsoft.com/office/drawing/2010/main">
-                <a:solidFill>
-                  <a:srgbClr val="FFFFFF"/>
-                </a:solidFill>
-              </a14:hiddenFill>
-            </a:ext>
-          </a:extLst>
-        </p:spPr>
-      </p:pic>
-      <p:pic>
-        <p:nvPicPr>
-          <p:cNvPr id="2052" name="Picture 4" descr="Sonos (@Sonos) / X">
-            <a:extLst>
-              <a:ext uri="{FF2B5EF4-FFF2-40B4-BE49-F238E27FC236}">
-                <a16:creationId xmlns:a16="http://schemas.microsoft.com/office/drawing/2014/main" id="{26C00C47-A89F-E384-B84E-E6CD19FC3446}"/>
-              </a:ext>
-            </a:extLst>
-          </p:cNvPr>
-          <p:cNvPicPr>
-            <a:picLocks noChangeAspect="1" noChangeArrowheads="1"/>
-          </p:cNvPicPr>
-          <p:nvPr/>
-        </p:nvPicPr>
-        <p:blipFill>
-          <a:blip r:embed="rId11">
-            <a:extLst>
-              <a:ext uri="{28A0092B-C50C-407E-A947-70E740481C1C}">
-                <a14:useLocalDpi xmlns:a14="http://schemas.microsoft.com/office/drawing/2010/main" val="0"/>
-              </a:ext>
-            </a:extLst>
-          </a:blip>
-          <a:srcRect/>
-          <a:stretch>
-            <a:fillRect/>
-          </a:stretch>
-        </p:blipFill>
-        <p:spPr bwMode="auto">
-          <a:xfrm>
-            <a:off x="10839589" y="811324"/>
-            <a:ext cx="663774" cy="663774"/>
-          </a:xfrm>
-          <a:prstGeom prst="rect">
-            <a:avLst/>
-          </a:prstGeom>
-          <a:noFill/>
-          <a:extLst>
-            <a:ext uri="{909E8E84-426E-40DD-AFC4-6F175D3DCCD1}">
-              <a14:hiddenFill xmlns:a14="http://schemas.microsoft.com/office/drawing/2010/main">
-                <a:solidFill>
-                  <a:srgbClr val="FFFFFF"/>
-                </a:solidFill>
-              </a14:hiddenFill>
-            </a:ext>
-          </a:extLst>
-        </p:spPr>
-      </p:pic>
-      <p:cxnSp>
-        <p:nvCxnSpPr>
-          <p:cNvPr id="4" name="Elbow Connector 3">
-            <a:extLst>
-              <a:ext uri="{FF2B5EF4-FFF2-40B4-BE49-F238E27FC236}">
-                <a16:creationId xmlns:a16="http://schemas.microsoft.com/office/drawing/2014/main" id="{9C03084C-01FF-EADE-E0EA-41A4C5CB73BE}"/>
-              </a:ext>
-            </a:extLst>
-          </p:cNvPr>
-          <p:cNvCxnSpPr>
-            <a:cxnSpLocks/>
-            <a:stCxn id="1032" idx="3"/>
-            <a:endCxn id="2052" idx="1"/>
-          </p:cNvCxnSpPr>
-          <p:nvPr/>
-        </p:nvCxnSpPr>
-        <p:spPr>
-          <a:xfrm flipV="1">
-            <a:off x="7168729" y="1143211"/>
-            <a:ext cx="3670860" cy="848796"/>
-          </a:xfrm>
-          <a:prstGeom prst="bentConnector3">
-            <a:avLst>
-              <a:gd name="adj1" fmla="val 50000"/>
-            </a:avLst>
-          </a:prstGeom>
-          <a:ln>
-            <a:prstDash val="dash"/>
-            <a:tailEnd type="triangle"/>
-          </a:ln>
-        </p:spPr>
-        <p:style>
-          <a:lnRef idx="1">
-            <a:schemeClr val="accent1"/>
-          </a:lnRef>
-          <a:fillRef idx="0">
-            <a:schemeClr val="accent1"/>
-          </a:fillRef>
-          <a:effectRef idx="0">
-            <a:schemeClr val="accent1"/>
-          </a:effectRef>
-          <a:fontRef idx="minor">
-            <a:schemeClr val="tx1"/>
-          </a:fontRef>
-        </p:style>
-      </p:cxnSp>
-      <p:sp>
-        <p:nvSpPr>
-          <p:cNvPr id="25" name="TextBox 24">
-            <a:extLst>
-              <a:ext uri="{FF2B5EF4-FFF2-40B4-BE49-F238E27FC236}">
-                <a16:creationId xmlns:a16="http://schemas.microsoft.com/office/drawing/2014/main" id="{32781755-4071-3151-96C2-6097FFA1B5D5}"/>
-              </a:ext>
-            </a:extLst>
-          </p:cNvPr>
-          <p:cNvSpPr txBox="1"/>
-          <p:nvPr/>
-        </p:nvSpPr>
-        <p:spPr>
-          <a:xfrm>
-            <a:off x="9049111" y="757798"/>
-            <a:ext cx="1097765" cy="276999"/>
-          </a:xfrm>
-          <a:prstGeom prst="rect">
-            <a:avLst/>
-          </a:prstGeom>
-          <a:noFill/>
-        </p:spPr>
-        <p:txBody>
-          <a:bodyPr wrap="square" rtlCol="0">
-            <a:spAutoFit/>
-          </a:bodyPr>
-          <a:lstStyle/>
-          <a:p>
-            <a:r>
-              <a:rPr lang="en-US" sz="1200" dirty="0"/>
-              <a:t>Play goal horn</a:t>
-            </a:r>
-          </a:p>
-        </p:txBody>
-      </p:sp>
-      <p:sp>
-        <p:nvSpPr>
-          <p:cNvPr id="33" name="TextBox 32">
-            <a:extLst>
-              <a:ext uri="{FF2B5EF4-FFF2-40B4-BE49-F238E27FC236}">
-                <a16:creationId xmlns:a16="http://schemas.microsoft.com/office/drawing/2014/main" id="{D7C22050-A004-9DDE-51D5-9FAAABEFC219}"/>
-              </a:ext>
-            </a:extLst>
-          </p:cNvPr>
-          <p:cNvSpPr txBox="1"/>
-          <p:nvPr/>
-        </p:nvSpPr>
-        <p:spPr>
-          <a:xfrm>
-            <a:off x="4597574" y="145259"/>
-            <a:ext cx="3670859" cy="954107"/>
-          </a:xfrm>
-          <a:prstGeom prst="rect">
-            <a:avLst/>
-          </a:prstGeom>
-          <a:noFill/>
-        </p:spPr>
-        <p:txBody>
-          <a:bodyPr wrap="square" rtlCol="0">
-            <a:spAutoFit/>
-          </a:bodyPr>
-          <a:lstStyle/>
-          <a:p>
-            <a:r>
-              <a:rPr lang="en-US" sz="1100" dirty="0">
-                <a:latin typeface="Menlo" panose="020B0609030804020204" pitchFamily="49" charset="0"/>
-                <a:ea typeface="Menlo" panose="020B0609030804020204" pitchFamily="49" charset="0"/>
-                <a:cs typeface="Menlo" panose="020B0609030804020204" pitchFamily="49" charset="0"/>
-              </a:rPr>
-              <a:t># Flask webhook listener</a:t>
-            </a:r>
-          </a:p>
-          <a:p>
-            <a:r>
-              <a:rPr lang="en-US" sz="1100" dirty="0">
-                <a:latin typeface="Menlo" panose="020B0609030804020204" pitchFamily="49" charset="0"/>
-                <a:ea typeface="Menlo" panose="020B0609030804020204" pitchFamily="49" charset="0"/>
-                <a:cs typeface="Menlo" panose="020B0609030804020204" pitchFamily="49" charset="0"/>
-              </a:rPr>
-              <a:t># </a:t>
-            </a:r>
-            <a:r>
-              <a:rPr lang="en-US" sz="1100" dirty="0" err="1">
-                <a:latin typeface="Menlo" panose="020B0609030804020204" pitchFamily="49" charset="0"/>
-                <a:ea typeface="Menlo" panose="020B0609030804020204" pitchFamily="49" charset="0"/>
-                <a:cs typeface="Menlo" panose="020B0609030804020204" pitchFamily="49" charset="0"/>
-              </a:rPr>
-              <a:t>systemd</a:t>
-            </a:r>
-            <a:r>
-              <a:rPr lang="en-US" sz="1100" dirty="0">
-                <a:latin typeface="Menlo" panose="020B0609030804020204" pitchFamily="49" charset="0"/>
-                <a:ea typeface="Menlo" panose="020B0609030804020204" pitchFamily="49" charset="0"/>
-                <a:cs typeface="Menlo" panose="020B0609030804020204" pitchFamily="49" charset="0"/>
-              </a:rPr>
-              <a:t> for starting </a:t>
-            </a:r>
-            <a:r>
-              <a:rPr lang="en-US" sz="1100" dirty="0" err="1">
-                <a:latin typeface="Menlo" panose="020B0609030804020204" pitchFamily="49" charset="0"/>
-                <a:ea typeface="Menlo" panose="020B0609030804020204" pitchFamily="49" charset="0"/>
-                <a:cs typeface="Menlo" panose="020B0609030804020204" pitchFamily="49" charset="0"/>
-              </a:rPr>
-              <a:t>goal_tracker</a:t>
-            </a:r>
-            <a:endParaRPr lang="en-US" sz="1100" dirty="0">
-              <a:latin typeface="Menlo" panose="020B0609030804020204" pitchFamily="49" charset="0"/>
-              <a:ea typeface="Menlo" panose="020B0609030804020204" pitchFamily="49" charset="0"/>
-              <a:cs typeface="Menlo" panose="020B0609030804020204" pitchFamily="49" charset="0"/>
-            </a:endParaRPr>
-          </a:p>
-          <a:p>
-            <a:r>
-              <a:rPr lang="en-US" sz="1100" dirty="0">
-                <a:latin typeface="Menlo" panose="020B0609030804020204" pitchFamily="49" charset="0"/>
-                <a:ea typeface="Menlo" panose="020B0609030804020204" pitchFamily="49" charset="0"/>
-                <a:cs typeface="Menlo" panose="020B0609030804020204" pitchFamily="49" charset="0"/>
-              </a:rPr>
-              <a:t># </a:t>
-            </a:r>
-            <a:r>
-              <a:rPr lang="en-US" sz="1100" dirty="0" err="1">
-                <a:latin typeface="Menlo" panose="020B0609030804020204" pitchFamily="49" charset="0"/>
-                <a:ea typeface="Menlo" panose="020B0609030804020204" pitchFamily="49" charset="0"/>
-                <a:cs typeface="Menlo" panose="020B0609030804020204" pitchFamily="49" charset="0"/>
-              </a:rPr>
-              <a:t>systemd</a:t>
-            </a:r>
-            <a:r>
-              <a:rPr lang="en-US" sz="1100" dirty="0">
-                <a:latin typeface="Menlo" panose="020B0609030804020204" pitchFamily="49" charset="0"/>
-                <a:ea typeface="Menlo" panose="020B0609030804020204" pitchFamily="49" charset="0"/>
-                <a:cs typeface="Menlo" panose="020B0609030804020204" pitchFamily="49" charset="0"/>
-              </a:rPr>
-              <a:t> for auto restart of flask webhook listener</a:t>
-            </a:r>
-          </a:p>
-          <a:p>
-            <a:endParaRPr lang="en-US" sz="1200" dirty="0"/>
-          </a:p>
-        </p:txBody>
-      </p:sp>
     </p:spTree>
     <p:extLst>
       <p:ext uri="{BB962C8B-B14F-4D97-AF65-F5344CB8AC3E}">

</xml_diff>